<commit_message>
final changes to questionnaires and video script
</commit_message>
<xml_diff>
--- a/Docs/vision/zaplify consumer video 4.pptx
+++ b/Docs/vision/zaplify consumer video 4.pptx
@@ -5821,13 +5821,28 @@
             </a:r>
             <a:r>
               <a:rPr lang="en-US" sz="2400" dirty="0" smtClean="0"/>
-              <a:t> remembers that you cleaned the gutters last winter, </a:t>
+              <a:t> remembers that </a:t>
+            </a:r>
+            <a:r>
+              <a:rPr lang="en-US" sz="2400" dirty="0" smtClean="0"/>
+              <a:t>last winter y</a:t>
+            </a:r>
+            <a:r>
+              <a:rPr lang="en-US" sz="2400" dirty="0" smtClean="0"/>
+              <a:t>ou completed the task of cleaning </a:t>
+            </a:r>
+            <a:r>
+              <a:rPr lang="en-US" sz="2400" dirty="0" smtClean="0"/>
+              <a:t>the </a:t>
+            </a:r>
+            <a:r>
+              <a:rPr lang="en-US" sz="2400" dirty="0" smtClean="0"/>
+              <a:t>gutters, </a:t>
             </a:r>
             <a:r>
               <a:rPr lang="en-US" sz="2400" dirty="0" smtClean="0"/>
               <a:t>so it can…</a:t>
             </a:r>
-            <a:endParaRPr lang="en-US" sz="2400" dirty="0" smtClean="0"/>
           </a:p>
           <a:p>
             <a:pPr>
@@ -5864,15 +5879,7 @@
             </a:r>
             <a:r>
               <a:rPr lang="en-US" sz="2400" dirty="0" smtClean="0"/>
-              <a:t>winter </a:t>
-            </a:r>
-            <a:r>
-              <a:rPr lang="en-US" sz="2400" dirty="0" smtClean="0"/>
-              <a:t>with </a:t>
-            </a:r>
-            <a:r>
-              <a:rPr lang="en-US" sz="2400" dirty="0" smtClean="0"/>
-              <a:t>one click</a:t>
+              <a:t>winter with one click</a:t>
             </a:r>
             <a:endParaRPr lang="en-US" sz="2400" dirty="0"/>
           </a:p>
@@ -5919,11 +5926,7 @@
             </a:pPr>
             <a:r>
               <a:rPr lang="en-US" sz="2400" dirty="0" smtClean="0"/>
-              <a:t>find </a:t>
-            </a:r>
-            <a:r>
-              <a:rPr lang="en-US" sz="2400" dirty="0" smtClean="0"/>
-              <a:t>out which services your friends have used and how they rated them</a:t>
+              <a:t>find out which services your friends have used and how they rated them</a:t>
             </a:r>
           </a:p>
           <a:p>
@@ -5934,11 +5937,7 @@
             </a:pPr>
             <a:r>
               <a:rPr lang="en-US" sz="2400" dirty="0" smtClean="0"/>
-              <a:t>share </a:t>
-            </a:r>
-            <a:r>
-              <a:rPr lang="en-US" sz="2400" dirty="0" smtClean="0"/>
-              <a:t>your experience with your friends</a:t>
+              <a:t>share your experience with your friends</a:t>
             </a:r>
           </a:p>
         </p:txBody>
@@ -7134,15 +7133,7 @@
             </a:r>
             <a:r>
               <a:rPr lang="en-US" sz="2400" dirty="0" smtClean="0"/>
-              <a:t>learns about recurring patterns in your life and </a:t>
-            </a:r>
-            <a:r>
-              <a:rPr lang="en-US" sz="2400" dirty="0" smtClean="0"/>
-              <a:t>what </a:t>
-            </a:r>
-            <a:r>
-              <a:rPr lang="en-US" sz="2400" dirty="0" smtClean="0"/>
-              <a:t>you’re likely to do in the future</a:t>
+              <a:t>learns about recurring patterns in your life and what you’re likely to do in the future</a:t>
             </a:r>
             <a:endParaRPr lang="en-US" sz="2400" dirty="0"/>
           </a:p>

</xml_diff>